<commit_message>
log resdiduals as percent, new plots
</commit_message>
<xml_diff>
--- a/python/cfg_reports/worksheets/gPCD Data Anaylisis.pptx
+++ b/python/cfg_reports/worksheets/gPCD Data Anaylisis.pptx
@@ -3359,7 +3359,7 @@
           <a:p>
             <a:fld id="{881A9FFB-1245-4C55-B1DA-652A95BDF5D2}" type="datetimeFigureOut">
               <a:rPr lang="en-US" smtClean="0"/>
-              <a:t>8/23/2025</a:t>
+              <a:t>8/29/2025</a:t>
             </a:fld>
             <a:endParaRPr lang="en-US"/>
           </a:p>
@@ -3557,7 +3557,7 @@
           <a:p>
             <a:fld id="{881A9FFB-1245-4C55-B1DA-652A95BDF5D2}" type="datetimeFigureOut">
               <a:rPr lang="en-US" smtClean="0"/>
-              <a:t>8/23/2025</a:t>
+              <a:t>8/29/2025</a:t>
             </a:fld>
             <a:endParaRPr lang="en-US"/>
           </a:p>
@@ -3765,7 +3765,7 @@
           <a:p>
             <a:fld id="{881A9FFB-1245-4C55-B1DA-652A95BDF5D2}" type="datetimeFigureOut">
               <a:rPr lang="en-US" smtClean="0"/>
-              <a:t>8/23/2025</a:t>
+              <a:t>8/29/2025</a:t>
             </a:fld>
             <a:endParaRPr lang="en-US"/>
           </a:p>
@@ -3963,7 +3963,7 @@
           <a:p>
             <a:fld id="{881A9FFB-1245-4C55-B1DA-652A95BDF5D2}" type="datetimeFigureOut">
               <a:rPr lang="en-US" smtClean="0"/>
-              <a:t>8/23/2025</a:t>
+              <a:t>8/29/2025</a:t>
             </a:fld>
             <a:endParaRPr lang="en-US"/>
           </a:p>
@@ -4238,7 +4238,7 @@
           <a:p>
             <a:fld id="{881A9FFB-1245-4C55-B1DA-652A95BDF5D2}" type="datetimeFigureOut">
               <a:rPr lang="en-US" smtClean="0"/>
-              <a:t>8/23/2025</a:t>
+              <a:t>8/29/2025</a:t>
             </a:fld>
             <a:endParaRPr lang="en-US"/>
           </a:p>
@@ -4503,7 +4503,7 @@
           <a:p>
             <a:fld id="{881A9FFB-1245-4C55-B1DA-652A95BDF5D2}" type="datetimeFigureOut">
               <a:rPr lang="en-US" smtClean="0"/>
-              <a:t>8/23/2025</a:t>
+              <a:t>8/29/2025</a:t>
             </a:fld>
             <a:endParaRPr lang="en-US"/>
           </a:p>
@@ -4915,7 +4915,7 @@
           <a:p>
             <a:fld id="{881A9FFB-1245-4C55-B1DA-652A95BDF5D2}" type="datetimeFigureOut">
               <a:rPr lang="en-US" smtClean="0"/>
-              <a:t>8/23/2025</a:t>
+              <a:t>8/29/2025</a:t>
             </a:fld>
             <a:endParaRPr lang="en-US"/>
           </a:p>
@@ -5056,7 +5056,7 @@
           <a:p>
             <a:fld id="{881A9FFB-1245-4C55-B1DA-652A95BDF5D2}" type="datetimeFigureOut">
               <a:rPr lang="en-US" smtClean="0"/>
-              <a:t>8/23/2025</a:t>
+              <a:t>8/29/2025</a:t>
             </a:fld>
             <a:endParaRPr lang="en-US"/>
           </a:p>
@@ -5169,7 +5169,7 @@
           <a:p>
             <a:fld id="{881A9FFB-1245-4C55-B1DA-652A95BDF5D2}" type="datetimeFigureOut">
               <a:rPr lang="en-US" smtClean="0"/>
-              <a:t>8/23/2025</a:t>
+              <a:t>8/29/2025</a:t>
             </a:fld>
             <a:endParaRPr lang="en-US"/>
           </a:p>
@@ -5480,7 +5480,7 @@
           <a:p>
             <a:fld id="{881A9FFB-1245-4C55-B1DA-652A95BDF5D2}" type="datetimeFigureOut">
               <a:rPr lang="en-US" smtClean="0"/>
-              <a:t>8/23/2025</a:t>
+              <a:t>8/29/2025</a:t>
             </a:fld>
             <a:endParaRPr lang="en-US"/>
           </a:p>
@@ -5768,7 +5768,7 @@
           <a:p>
             <a:fld id="{881A9FFB-1245-4C55-B1DA-652A95BDF5D2}" type="datetimeFigureOut">
               <a:rPr lang="en-US" smtClean="0"/>
-              <a:t>8/23/2025</a:t>
+              <a:t>8/29/2025</a:t>
             </a:fld>
             <a:endParaRPr lang="en-US"/>
           </a:p>
@@ -6009,7 +6009,7 @@
           <a:p>
             <a:fld id="{881A9FFB-1245-4C55-B1DA-652A95BDF5D2}" type="datetimeFigureOut">
               <a:rPr lang="en-US" smtClean="0"/>
-              <a:t>8/23/2025</a:t>
+              <a:t>8/29/2025</a:t>
             </a:fld>
             <a:endParaRPr lang="en-US"/>
           </a:p>
@@ -8222,7 +8222,7 @@
           <p:nvPr>
             <p:extLst>
               <p:ext uri="{D42A27DB-BD31-4B8C-83A1-F6EECF244321}">
-                <p14:modId xmlns:p14="http://schemas.microsoft.com/office/powerpoint/2010/main" val="3857155456"/>
+                <p14:modId xmlns:p14="http://schemas.microsoft.com/office/powerpoint/2010/main" val="3560449455"/>
               </p:ext>
             </p:extLst>
           </p:nvPr>
@@ -8576,7 +8576,7 @@
           <p:nvPr>
             <p:extLst>
               <p:ext uri="{D42A27DB-BD31-4B8C-83A1-F6EECF244321}">
-                <p14:modId xmlns:p14="http://schemas.microsoft.com/office/powerpoint/2010/main" val="1417912087"/>
+                <p14:modId xmlns:p14="http://schemas.microsoft.com/office/powerpoint/2010/main" val="1222289864"/>
               </p:ext>
             </p:extLst>
           </p:nvPr>
@@ -8766,7 +8766,7 @@
           <p:nvPr>
             <p:extLst>
               <p:ext uri="{D42A27DB-BD31-4B8C-83A1-F6EECF244321}">
-                <p14:modId xmlns:p14="http://schemas.microsoft.com/office/powerpoint/2010/main" val="566682453"/>
+                <p14:modId xmlns:p14="http://schemas.microsoft.com/office/powerpoint/2010/main" val="2767659045"/>
               </p:ext>
             </p:extLst>
           </p:nvPr>
@@ -8951,7 +8951,7 @@
           <p:nvPr>
             <p:extLst>
               <p:ext uri="{D42A27DB-BD31-4B8C-83A1-F6EECF244321}">
-                <p14:modId xmlns:p14="http://schemas.microsoft.com/office/powerpoint/2010/main" val="422435238"/>
+                <p14:modId xmlns:p14="http://schemas.microsoft.com/office/powerpoint/2010/main" val="2850245791"/>
               </p:ext>
             </p:extLst>
           </p:nvPr>
@@ -9155,7 +9155,7 @@
           <p:nvPr>
             <p:extLst>
               <p:ext uri="{D42A27DB-BD31-4B8C-83A1-F6EECF244321}">
-                <p14:modId xmlns:p14="http://schemas.microsoft.com/office/powerpoint/2010/main" val="2786192993"/>
+                <p14:modId xmlns:p14="http://schemas.microsoft.com/office/powerpoint/2010/main" val="237717437"/>
               </p:ext>
             </p:extLst>
           </p:nvPr>
@@ -9337,7 +9337,7 @@
           <p:nvPr>
             <p:extLst>
               <p:ext uri="{D42A27DB-BD31-4B8C-83A1-F6EECF244321}">
-                <p14:modId xmlns:p14="http://schemas.microsoft.com/office/powerpoint/2010/main" val="1530933734"/>
+                <p14:modId xmlns:p14="http://schemas.microsoft.com/office/powerpoint/2010/main" val="822295357"/>
               </p:ext>
             </p:extLst>
           </p:nvPr>
@@ -9659,7 +9659,7 @@
           <p:nvPr>
             <p:extLst>
               <p:ext uri="{D42A27DB-BD31-4B8C-83A1-F6EECF244321}">
-                <p14:modId xmlns:p14="http://schemas.microsoft.com/office/powerpoint/2010/main" val="3256687165"/>
+                <p14:modId xmlns:p14="http://schemas.microsoft.com/office/powerpoint/2010/main" val="3188602990"/>
               </p:ext>
             </p:extLst>
           </p:nvPr>
@@ -9844,7 +9844,7 @@
           <p:nvPr>
             <p:extLst>
               <p:ext uri="{D42A27DB-BD31-4B8C-83A1-F6EECF244321}">
-                <p14:modId xmlns:p14="http://schemas.microsoft.com/office/powerpoint/2010/main" val="3737290989"/>
+                <p14:modId xmlns:p14="http://schemas.microsoft.com/office/powerpoint/2010/main" val="3145069905"/>
               </p:ext>
             </p:extLst>
           </p:nvPr>
@@ -10034,7 +10034,7 @@
           <p:nvPr>
             <p:extLst>
               <p:ext uri="{D42A27DB-BD31-4B8C-83A1-F6EECF244321}">
-                <p14:modId xmlns:p14="http://schemas.microsoft.com/office/powerpoint/2010/main" val="911618154"/>
+                <p14:modId xmlns:p14="http://schemas.microsoft.com/office/powerpoint/2010/main" val="3077548469"/>
               </p:ext>
             </p:extLst>
           </p:nvPr>
@@ -10219,7 +10219,7 @@
           <p:nvPr>
             <p:extLst>
               <p:ext uri="{D42A27DB-BD31-4B8C-83A1-F6EECF244321}">
-                <p14:modId xmlns:p14="http://schemas.microsoft.com/office/powerpoint/2010/main" val="1665269753"/>
+                <p14:modId xmlns:p14="http://schemas.microsoft.com/office/powerpoint/2010/main" val="352260658"/>
               </p:ext>
             </p:extLst>
           </p:nvPr>
@@ -10843,7 +10843,7 @@
           <p:nvPr>
             <p:extLst>
               <p:ext uri="{D42A27DB-BD31-4B8C-83A1-F6EECF244321}">
-                <p14:modId xmlns:p14="http://schemas.microsoft.com/office/powerpoint/2010/main" val="353703473"/>
+                <p14:modId xmlns:p14="http://schemas.microsoft.com/office/powerpoint/2010/main" val="852954406"/>
               </p:ext>
             </p:extLst>
           </p:nvPr>
@@ -11110,7 +11110,7 @@
           <p:nvPr>
             <p:extLst>
               <p:ext uri="{D42A27DB-BD31-4B8C-83A1-F6EECF244321}">
-                <p14:modId xmlns:p14="http://schemas.microsoft.com/office/powerpoint/2010/main" val="2856431615"/>
+                <p14:modId xmlns:p14="http://schemas.microsoft.com/office/powerpoint/2010/main" val="2701527959"/>
               </p:ext>
             </p:extLst>
           </p:nvPr>
@@ -11280,7 +11280,7 @@
           <p:nvPr>
             <p:extLst>
               <p:ext uri="{D42A27DB-BD31-4B8C-83A1-F6EECF244321}">
-                <p14:modId xmlns:p14="http://schemas.microsoft.com/office/powerpoint/2010/main" val="1822915908"/>
+                <p14:modId xmlns:p14="http://schemas.microsoft.com/office/powerpoint/2010/main" val="3996035430"/>
               </p:ext>
             </p:extLst>
           </p:nvPr>
@@ -11456,7 +11456,7 @@
           <p:nvPr>
             <p:extLst>
               <p:ext uri="{D42A27DB-BD31-4B8C-83A1-F6EECF244321}">
-                <p14:modId xmlns:p14="http://schemas.microsoft.com/office/powerpoint/2010/main" val="1176015987"/>
+                <p14:modId xmlns:p14="http://schemas.microsoft.com/office/powerpoint/2010/main" val="1797803562"/>
               </p:ext>
             </p:extLst>
           </p:nvPr>
@@ -11848,7 +11848,7 @@
           <p:nvPr>
             <p:extLst>
               <p:ext uri="{D42A27DB-BD31-4B8C-83A1-F6EECF244321}">
-                <p14:modId xmlns:p14="http://schemas.microsoft.com/office/powerpoint/2010/main" val="2613138210"/>
+                <p14:modId xmlns:p14="http://schemas.microsoft.com/office/powerpoint/2010/main" val="3273871911"/>
               </p:ext>
             </p:extLst>
           </p:nvPr>

</xml_diff>